<commit_message>
Final version, marco's changes
</commit_message>
<xml_diff>
--- a/docs/MR3.pptx
+++ b/docs/MR3.pptx
@@ -201,7 +201,7 @@
           <a:p>
             <a:fld id="{D0C85FD9-566C-4982-9C2E-F46B57D7177D}" type="datetimeFigureOut">
               <a:rPr lang="de-AT" smtClean="0"/>
-              <a:t>24.06.2014</a:t>
+              <a:t>25.06.2014</a:t>
             </a:fld>
             <a:endParaRPr lang="de-AT"/>
           </a:p>
@@ -1832,7 +1832,7 @@
             <a:fld id="{B61BEF0D-F0BB-DE4B-95CE-6DB70DBA9567}" type="datetimeFigureOut">
               <a:rPr lang="en-US" dirty="0"/>
               <a:pPr/>
-              <a:t>6/24/2014</a:t>
+              <a:t>6/25/2014</a:t>
             </a:fld>
             <a:endParaRPr lang="en-US" dirty="0"/>
           </a:p>
@@ -2125,7 +2125,7 @@
             <a:fld id="{B61BEF0D-F0BB-DE4B-95CE-6DB70DBA9567}" type="datetimeFigureOut">
               <a:rPr lang="en-US" dirty="0"/>
               <a:pPr/>
-              <a:t>6/24/2014</a:t>
+              <a:t>6/25/2014</a:t>
             </a:fld>
             <a:endParaRPr lang="en-US" dirty="0"/>
           </a:p>
@@ -2370,7 +2370,7 @@
             <a:fld id="{B61BEF0D-F0BB-DE4B-95CE-6DB70DBA9567}" type="datetimeFigureOut">
               <a:rPr lang="en-US" dirty="0"/>
               <a:pPr/>
-              <a:t>6/24/2014</a:t>
+              <a:t>6/25/2014</a:t>
             </a:fld>
             <a:endParaRPr lang="en-US" dirty="0"/>
           </a:p>
@@ -2907,7 +2907,7 @@
             <a:fld id="{B61BEF0D-F0BB-DE4B-95CE-6DB70DBA9567}" type="datetimeFigureOut">
               <a:rPr lang="en-US" dirty="0"/>
               <a:pPr/>
-              <a:t>6/24/2014</a:t>
+              <a:t>6/25/2014</a:t>
             </a:fld>
             <a:endParaRPr lang="en-US" dirty="0"/>
           </a:p>
@@ -3152,7 +3152,7 @@
             <a:fld id="{B61BEF0D-F0BB-DE4B-95CE-6DB70DBA9567}" type="datetimeFigureOut">
               <a:rPr lang="en-US" dirty="0"/>
               <a:pPr/>
-              <a:t>6/24/2014</a:t>
+              <a:t>6/25/2014</a:t>
             </a:fld>
             <a:endParaRPr lang="en-US" dirty="0"/>
           </a:p>
@@ -3681,7 +3681,7 @@
             <a:fld id="{B61BEF0D-F0BB-DE4B-95CE-6DB70DBA9567}" type="datetimeFigureOut">
               <a:rPr lang="en-US" dirty="0"/>
               <a:pPr/>
-              <a:t>6/24/2014</a:t>
+              <a:t>6/25/2014</a:t>
             </a:fld>
             <a:endParaRPr lang="en-US" dirty="0"/>
           </a:p>
@@ -3975,7 +3975,7 @@
             <a:fld id="{B61BEF0D-F0BB-DE4B-95CE-6DB70DBA9567}" type="datetimeFigureOut">
               <a:rPr lang="en-US" dirty="0"/>
               <a:pPr/>
-              <a:t>6/24/2014</a:t>
+              <a:t>6/25/2014</a:t>
             </a:fld>
             <a:endParaRPr lang="en-US" dirty="0"/>
           </a:p>
@@ -4146,7 +4146,7 @@
             <a:fld id="{B61BEF0D-F0BB-DE4B-95CE-6DB70DBA9567}" type="datetimeFigureOut">
               <a:rPr lang="en-US" dirty="0"/>
               <a:pPr/>
-              <a:t>6/24/2014</a:t>
+              <a:t>6/25/2014</a:t>
             </a:fld>
             <a:endParaRPr lang="en-US" dirty="0"/>
           </a:p>
@@ -4323,7 +4323,7 @@
             <a:fld id="{B61BEF0D-F0BB-DE4B-95CE-6DB70DBA9567}" type="datetimeFigureOut">
               <a:rPr lang="en-US" dirty="0"/>
               <a:pPr/>
-              <a:t>6/24/2014</a:t>
+              <a:t>6/25/2014</a:t>
             </a:fld>
             <a:endParaRPr lang="en-US" dirty="0"/>
           </a:p>
@@ -4490,7 +4490,7 @@
             <a:fld id="{B61BEF0D-F0BB-DE4B-95CE-6DB70DBA9567}" type="datetimeFigureOut">
               <a:rPr lang="en-US" dirty="0"/>
               <a:pPr/>
-              <a:t>6/24/2014</a:t>
+              <a:t>6/25/2014</a:t>
             </a:fld>
             <a:endParaRPr lang="en-US" dirty="0"/>
           </a:p>
@@ -4738,7 +4738,7 @@
             <a:fld id="{B61BEF0D-F0BB-DE4B-95CE-6DB70DBA9567}" type="datetimeFigureOut">
               <a:rPr lang="en-US" dirty="0"/>
               <a:pPr/>
-              <a:t>6/24/2014</a:t>
+              <a:t>6/25/2014</a:t>
             </a:fld>
             <a:endParaRPr lang="en-US" dirty="0"/>
           </a:p>
@@ -5032,7 +5032,7 @@
             <a:fld id="{B61BEF0D-F0BB-DE4B-95CE-6DB70DBA9567}" type="datetimeFigureOut">
               <a:rPr lang="en-US" dirty="0"/>
               <a:pPr/>
-              <a:t>6/24/2014</a:t>
+              <a:t>6/25/2014</a:t>
             </a:fld>
             <a:endParaRPr lang="en-US" dirty="0"/>
           </a:p>
@@ -5471,7 +5471,7 @@
             <a:fld id="{B61BEF0D-F0BB-DE4B-95CE-6DB70DBA9567}" type="datetimeFigureOut">
               <a:rPr lang="en-US" dirty="0"/>
               <a:pPr/>
-              <a:t>6/24/2014</a:t>
+              <a:t>6/25/2014</a:t>
             </a:fld>
             <a:endParaRPr lang="en-US" dirty="0"/>
           </a:p>
@@ -5586,7 +5586,7 @@
             <a:fld id="{B61BEF0D-F0BB-DE4B-95CE-6DB70DBA9567}" type="datetimeFigureOut">
               <a:rPr lang="en-US" dirty="0"/>
               <a:pPr/>
-              <a:t>6/24/2014</a:t>
+              <a:t>6/25/2014</a:t>
             </a:fld>
             <a:endParaRPr lang="en-US" dirty="0"/>
           </a:p>
@@ -5678,7 +5678,7 @@
             <a:fld id="{B61BEF0D-F0BB-DE4B-95CE-6DB70DBA9567}" type="datetimeFigureOut">
               <a:rPr lang="en-US" dirty="0"/>
               <a:pPr/>
-              <a:t>6/24/2014</a:t>
+              <a:t>6/25/2014</a:t>
             </a:fld>
             <a:endParaRPr lang="en-US" dirty="0"/>
           </a:p>
@@ -5958,7 +5958,7 @@
             <a:fld id="{B61BEF0D-F0BB-DE4B-95CE-6DB70DBA9567}" type="datetimeFigureOut">
               <a:rPr lang="en-US" dirty="0"/>
               <a:pPr/>
-              <a:t>6/24/2014</a:t>
+              <a:t>6/25/2014</a:t>
             </a:fld>
             <a:endParaRPr lang="en-US" dirty="0"/>
           </a:p>
@@ -6246,7 +6246,7 @@
             <a:fld id="{B61BEF0D-F0BB-DE4B-95CE-6DB70DBA9567}" type="datetimeFigureOut">
               <a:rPr lang="en-US" dirty="0"/>
               <a:pPr/>
-              <a:t>6/24/2014</a:t>
+              <a:t>6/25/2014</a:t>
             </a:fld>
             <a:endParaRPr lang="en-US" dirty="0"/>
           </a:p>
@@ -6773,7 +6773,7 @@
             <a:fld id="{B61BEF0D-F0BB-DE4B-95CE-6DB70DBA9567}" type="datetimeFigureOut">
               <a:rPr lang="en-US" dirty="0"/>
               <a:pPr/>
-              <a:t>6/24/2014</a:t>
+              <a:t>6/25/2014</a:t>
             </a:fld>
             <a:endParaRPr lang="en-US" dirty="0"/>
           </a:p>
@@ -7333,11 +7333,7 @@
             </a:br>
             <a:r>
               <a:rPr lang="en-AU" dirty="0" smtClean="0"/>
-              <a:t>M</a:t>
-            </a:r>
-            <a:r>
-              <a:rPr lang="en-AU" dirty="0" smtClean="0"/>
-              <a:t>R3</a:t>
+              <a:t>MR3</a:t>
             </a:r>
             <a:endParaRPr lang="en-AU" dirty="0"/>
           </a:p>
@@ -9268,7 +9264,7 @@
       </p:sp>
       <p:pic>
         <p:nvPicPr>
-          <p:cNvPr id="3" name="Grafik 2"/>
+          <p:cNvPr id="5" name="Grafik 4"/>
           <p:cNvPicPr>
             <a:picLocks noChangeAspect="1"/>
           </p:cNvPicPr>
@@ -9276,13 +9272,13 @@
         </p:nvPicPr>
         <p:blipFill rotWithShape="1">
           <a:blip r:embed="rId3"/>
-          <a:srcRect l="22559" t="30973" r="43857" b="31396"/>
+          <a:srcRect l="21771" t="34630" r="43958" b="28518"/>
           <a:stretch/>
         </p:blipFill>
         <p:spPr>
           <a:xfrm>
-            <a:off x="3422807" y="2438399"/>
-            <a:ext cx="6141720" cy="3870960"/>
+            <a:off x="3359942" y="2438399"/>
+            <a:ext cx="6267450" cy="3790950"/>
           </a:xfrm>
           <a:prstGeom prst="roundRect">
             <a:avLst>

</xml_diff>